<commit_message>
last set of lecture notes
</commit_message>
<xml_diff>
--- a/16-regression.pptx
+++ b/16-regression.pptx
@@ -729,7 +729,7 @@
         </p:nvSpPr>
         <p:spPr>
           <a:xfrm>
-            <a:off x="381300" y="685800"/>
+            <a:off x="381000" y="685800"/>
             <a:ext cx="6096000" cy="3429000"/>
           </a:xfrm>
           <a:custGeom>
@@ -7081,10 +7081,18 @@
               <a:buNone/>
             </a:pPr>
             <a:r>
-              <a:rPr lang="en"/>
-              <a:t>In regression we predict values rather than discrete labels.</a:t>
-            </a:r>
-            <a:endParaRPr/>
+              <a:rPr lang="en" dirty="0"/>
+              <a:t>In regression we predict </a:t>
+            </a:r>
+            <a:r>
+              <a:rPr lang="en" u="sng" dirty="0"/>
+              <a:t>values</a:t>
+            </a:r>
+            <a:r>
+              <a:rPr lang="en" dirty="0"/>
+              <a:t> rather than discrete labels.</a:t>
+            </a:r>
+            <a:endParaRPr dirty="0"/>
           </a:p>
           <a:p>
             <a:pPr marL="0" lvl="0" indent="0" rtl="0">
@@ -7096,7 +7104,7 @@
               </a:spcAft>
               <a:buNone/>
             </a:pPr>
-            <a:endParaRPr/>
+            <a:endParaRPr dirty="0"/>
           </a:p>
         </p:txBody>
       </p:sp>
@@ -7133,6 +7141,13 @@
   <p:clrMapOvr>
     <a:masterClrMapping/>
   </p:clrMapOvr>
+  <p:timing>
+    <p:tnLst>
+      <p:par>
+        <p:cTn id="1" dur="indefinite" restart="never" nodeType="tmRoot"/>
+      </p:par>
+    </p:tnLst>
+  </p:timing>
 </p:sld>
 </file>
 
@@ -10064,15 +10079,15 @@
               <a:t>mlp</a:t>
             </a:r>
             <a:r>
-              <a:rPr lang="en-US" smtClean="0"/>
+              <a:rPr lang="en-US" dirty="0" smtClean="0"/>
               <a:t>, </a:t>
             </a:r>
             <a:r>
-              <a:rPr lang="en" smtClean="0"/>
+              <a:rPr lang="en" dirty="0" smtClean="0"/>
               <a:t>tree</a:t>
             </a:r>
             <a:r>
-              <a:rPr lang="en"/>
+              <a:rPr lang="en" dirty="0"/>
               <a:t>, or </a:t>
             </a:r>
             <a:r>
@@ -10287,6 +10302,13 @@
   <p:clrMapOvr>
     <a:masterClrMapping/>
   </p:clrMapOvr>
+  <p:timing>
+    <p:tnLst>
+      <p:par>
+        <p:cTn id="1" dur="indefinite" restart="never" nodeType="tmRoot"/>
+      </p:par>
+    </p:tnLst>
+  </p:timing>
 </p:sld>
 </file>
 
@@ -11650,6 +11672,13 @@
   <p:clrMapOvr>
     <a:masterClrMapping/>
   </p:clrMapOvr>
+  <p:timing>
+    <p:tnLst>
+      <p:par>
+        <p:cTn id="1" dur="indefinite" restart="never" nodeType="tmRoot"/>
+      </p:par>
+    </p:tnLst>
+  </p:timing>
 </p:sld>
 </file>
 
@@ -11777,6 +11806,13 @@
   <p:clrMapOvr>
     <a:masterClrMapping/>
   </p:clrMapOvr>
+  <p:timing>
+    <p:tnLst>
+      <p:par>
+        <p:cTn id="1" dur="indefinite" restart="never" nodeType="tmRoot"/>
+      </p:par>
+    </p:tnLst>
+  </p:timing>
 </p:sld>
 </file>
 
@@ -11867,6 +11903,13 @@
   <p:clrMapOvr>
     <a:masterClrMapping/>
   </p:clrMapOvr>
+  <p:timing>
+    <p:tnLst>
+      <p:par>
+        <p:cTn id="1" dur="indefinite" restart="never" nodeType="tmRoot"/>
+      </p:par>
+    </p:tnLst>
+  </p:timing>
 </p:sld>
 </file>
 
@@ -12016,6 +12059,13 @@
   <p:clrMapOvr>
     <a:masterClrMapping/>
   </p:clrMapOvr>
+  <p:timing>
+    <p:tnLst>
+      <p:par>
+        <p:cTn id="1" dur="indefinite" restart="never" nodeType="tmRoot"/>
+      </p:par>
+    </p:tnLst>
+  </p:timing>
 </p:sld>
 </file>
 
@@ -12844,6 +12894,13 @@
   <p:clrMapOvr>
     <a:masterClrMapping/>
   </p:clrMapOvr>
+  <p:timing>
+    <p:tnLst>
+      <p:par>
+        <p:cTn id="1" dur="indefinite" restart="never" nodeType="tmRoot"/>
+      </p:par>
+    </p:tnLst>
+  </p:timing>
 </p:sld>
 </file>
 
@@ -13002,6 +13059,13 @@
   <p:clrMapOvr>
     <a:masterClrMapping/>
   </p:clrMapOvr>
+  <p:timing>
+    <p:tnLst>
+      <p:par>
+        <p:cTn id="1" dur="indefinite" restart="never" nodeType="tmRoot"/>
+      </p:par>
+    </p:tnLst>
+  </p:timing>
 </p:sld>
 </file>
 
@@ -13219,6 +13283,13 @@
   <p:clrMapOvr>
     <a:masterClrMapping/>
   </p:clrMapOvr>
+  <p:timing>
+    <p:tnLst>
+      <p:par>
+        <p:cTn id="1" dur="indefinite" restart="never" nodeType="tmRoot"/>
+      </p:par>
+    </p:tnLst>
+  </p:timing>
 </p:sld>
 </file>
 

</xml_diff>